<commit_message>
Update presentation Nov 22
</commit_message>
<xml_diff>
--- a/docs/meetings/20211121_D2_Gelati.pptx
+++ b/docs/meetings/20211121_D2_Gelati.pptx
@@ -3976,7 +3976,7 @@
         </p:nvSpPr>
         <p:spPr>
           <a:xfrm>
-            <a:off x="1057055" y="5630442"/>
+            <a:off x="1104406" y="5456717"/>
             <a:ext cx="2862028" cy="584775"/>
           </a:xfrm>
           <a:prstGeom prst="rect">
@@ -11193,7 +11193,7 @@
                 <a:latin typeface="+mj-lt"/>
                 <a:hlinkClick r:id="rId3"/>
               </a:rPr>
-              <a:t> </a:t>
+              <a:t> de </a:t>
             </a:r>
             <a:r>
               <a:rPr lang="en-US" sz="1600" dirty="0" err="1">
@@ -22429,8 +22429,8 @@
         </p:nvSpPr>
         <p:spPr>
           <a:xfrm>
-            <a:off x="1701169" y="5281406"/>
-            <a:ext cx="8009522" cy="646331"/>
+            <a:off x="1091572" y="5281406"/>
+            <a:ext cx="8888454" cy="646331"/>
           </a:xfrm>
           <a:prstGeom prst="rect">
             <a:avLst/>
@@ -22479,17 +22479,17 @@
               <a:rPr lang="en-US" dirty="0">
                 <a:hlinkClick r:id="rId3"/>
               </a:rPr>
-              <a:t>ReaLSAT</a:t>
+              <a:t>GRSAD</a:t>
             </a:r>
             <a:r>
               <a:rPr lang="en-US" dirty="0"/>
               <a:t>, </a:t>
             </a:r>
             <a:r>
-              <a:rPr lang="en-US" dirty="0">
+              <a:rPr lang="en-US" dirty="0" err="1">
                 <a:hlinkClick r:id="rId4"/>
               </a:rPr>
-              <a:t>ReGeom</a:t>
+              <a:t>ReaLSAT</a:t>
             </a:r>
             <a:r>
               <a:rPr lang="en-US" dirty="0"/>
@@ -22499,7 +22499,7 @@
               <a:rPr lang="en-US" dirty="0">
                 <a:hlinkClick r:id="rId5"/>
               </a:rPr>
-              <a:t>DAHITI</a:t>
+              <a:t>ReGeom</a:t>
             </a:r>
             <a:r>
               <a:rPr lang="en-US" dirty="0"/>
@@ -22508,6 +22508,16 @@
             <a:r>
               <a:rPr lang="en-US" dirty="0">
                 <a:hlinkClick r:id="rId6"/>
+              </a:rPr>
+              <a:t>DAHITI</a:t>
+            </a:r>
+            <a:r>
+              <a:rPr lang="en-US" dirty="0"/>
+              <a:t>, </a:t>
+            </a:r>
+            <a:r>
+              <a:rPr lang="en-US" dirty="0">
+                <a:hlinkClick r:id="rId7"/>
               </a:rPr>
               <a:t>Res-CN</a:t>
             </a:r>
@@ -22688,7 +22698,7 @@
           <p:nvPr/>
         </p:nvPicPr>
         <p:blipFill>
-          <a:blip r:embed="rId7">
+          <a:blip r:embed="rId8">
             <a:extLst>
               <a:ext uri="{28A0092B-C50C-407E-A947-70E740481C1C}">
                 <a14:useLocalDpi xmlns:a14="http://schemas.microsoft.com/office/drawing/2010/main" val="0"/>

</xml_diff>